<commit_message>
added another compartment to differentiate between exposed and asymptomatic
</commit_message>
<xml_diff>
--- a/Proposed compartmental model.pptx
+++ b/Proposed compartmental model.pptx
@@ -268,7 +268,7 @@
           <a:p>
             <a:fld id="{C437C6B8-CE28-7F48-9F13-5D6893AC2A38}" type="datetimeFigureOut">
               <a:rPr lang="en-US" smtClean="0"/>
-              <a:t>3/29/20</a:t>
+              <a:t>4/4/20</a:t>
             </a:fld>
             <a:endParaRPr lang="en-US"/>
           </a:p>
@@ -466,7 +466,7 @@
           <a:p>
             <a:fld id="{C437C6B8-CE28-7F48-9F13-5D6893AC2A38}" type="datetimeFigureOut">
               <a:rPr lang="en-US" smtClean="0"/>
-              <a:t>3/29/20</a:t>
+              <a:t>4/4/20</a:t>
             </a:fld>
             <a:endParaRPr lang="en-US"/>
           </a:p>
@@ -674,7 +674,7 @@
           <a:p>
             <a:fld id="{C437C6B8-CE28-7F48-9F13-5D6893AC2A38}" type="datetimeFigureOut">
               <a:rPr lang="en-US" smtClean="0"/>
-              <a:t>3/29/20</a:t>
+              <a:t>4/4/20</a:t>
             </a:fld>
             <a:endParaRPr lang="en-US"/>
           </a:p>
@@ -872,7 +872,7 @@
           <a:p>
             <a:fld id="{C437C6B8-CE28-7F48-9F13-5D6893AC2A38}" type="datetimeFigureOut">
               <a:rPr lang="en-US" smtClean="0"/>
-              <a:t>3/29/20</a:t>
+              <a:t>4/4/20</a:t>
             </a:fld>
             <a:endParaRPr lang="en-US"/>
           </a:p>
@@ -1147,7 +1147,7 @@
           <a:p>
             <a:fld id="{C437C6B8-CE28-7F48-9F13-5D6893AC2A38}" type="datetimeFigureOut">
               <a:rPr lang="en-US" smtClean="0"/>
-              <a:t>3/29/20</a:t>
+              <a:t>4/4/20</a:t>
             </a:fld>
             <a:endParaRPr lang="en-US"/>
           </a:p>
@@ -1412,7 +1412,7 @@
           <a:p>
             <a:fld id="{C437C6B8-CE28-7F48-9F13-5D6893AC2A38}" type="datetimeFigureOut">
               <a:rPr lang="en-US" smtClean="0"/>
-              <a:t>3/29/20</a:t>
+              <a:t>4/4/20</a:t>
             </a:fld>
             <a:endParaRPr lang="en-US"/>
           </a:p>
@@ -1824,7 +1824,7 @@
           <a:p>
             <a:fld id="{C437C6B8-CE28-7F48-9F13-5D6893AC2A38}" type="datetimeFigureOut">
               <a:rPr lang="en-US" smtClean="0"/>
-              <a:t>3/29/20</a:t>
+              <a:t>4/4/20</a:t>
             </a:fld>
             <a:endParaRPr lang="en-US"/>
           </a:p>
@@ -1965,7 +1965,7 @@
           <a:p>
             <a:fld id="{C437C6B8-CE28-7F48-9F13-5D6893AC2A38}" type="datetimeFigureOut">
               <a:rPr lang="en-US" smtClean="0"/>
-              <a:t>3/29/20</a:t>
+              <a:t>4/4/20</a:t>
             </a:fld>
             <a:endParaRPr lang="en-US"/>
           </a:p>
@@ -2078,7 +2078,7 @@
           <a:p>
             <a:fld id="{C437C6B8-CE28-7F48-9F13-5D6893AC2A38}" type="datetimeFigureOut">
               <a:rPr lang="en-US" smtClean="0"/>
-              <a:t>3/29/20</a:t>
+              <a:t>4/4/20</a:t>
             </a:fld>
             <a:endParaRPr lang="en-US"/>
           </a:p>
@@ -2389,7 +2389,7 @@
           <a:p>
             <a:fld id="{C437C6B8-CE28-7F48-9F13-5D6893AC2A38}" type="datetimeFigureOut">
               <a:rPr lang="en-US" smtClean="0"/>
-              <a:t>3/29/20</a:t>
+              <a:t>4/4/20</a:t>
             </a:fld>
             <a:endParaRPr lang="en-US"/>
           </a:p>
@@ -2677,7 +2677,7 @@
           <a:p>
             <a:fld id="{C437C6B8-CE28-7F48-9F13-5D6893AC2A38}" type="datetimeFigureOut">
               <a:rPr lang="en-US" smtClean="0"/>
-              <a:t>3/29/20</a:t>
+              <a:t>4/4/20</a:t>
             </a:fld>
             <a:endParaRPr lang="en-US"/>
           </a:p>
@@ -2918,7 +2918,7 @@
           <a:p>
             <a:fld id="{C437C6B8-CE28-7F48-9F13-5D6893AC2A38}" type="datetimeFigureOut">
               <a:rPr lang="en-US" smtClean="0"/>
-              <a:t>3/29/20</a:t>
+              <a:t>4/4/20</a:t>
             </a:fld>
             <a:endParaRPr lang="en-US"/>
           </a:p>
@@ -3938,8 +3938,8 @@
               </p:sp>
             </mc:Fallback>
           </mc:AlternateContent>
-          <mc:AlternateContent xmlns:mc="http://schemas.openxmlformats.org/markup-compatibility/2006" xmlns:a14="http://schemas.microsoft.com/office/drawing/2010/main">
-            <mc:Choice Requires="a14">
+          <mc:AlternateContent xmlns:mc="http://schemas.openxmlformats.org/markup-compatibility/2006">
+            <mc:Choice xmlns:a14="http://schemas.microsoft.com/office/drawing/2010/main" Requires="a14">
               <p:sp>
                 <p:nvSpPr>
                   <p:cNvPr id="5" name="Oval 4">
@@ -3992,10 +3992,10 @@
                         </m:oMathParaPr>
                         <m:oMath xmlns:m="http://schemas.openxmlformats.org/officeDocument/2006/math">
                           <m:r>
-                            <a:rPr lang="en-US" b="0" i="1" dirty="0" smtClean="0">
+                            <a:rPr lang="en-US" b="0" i="1" smtClean="0">
                               <a:latin typeface="Cambria Math" panose="02040503050406030204" pitchFamily="18" charset="0"/>
                             </a:rPr>
-                            <m:t>𝐸</m:t>
+                            <m:t>𝑎𝑠𝑦𝑚</m:t>
                           </m:r>
                         </m:oMath>
                       </m:oMathPara>
@@ -4005,7 +4005,7 @@
                 </p:txBody>
               </p:sp>
             </mc:Choice>
-            <mc:Fallback xmlns="">
+            <mc:Fallback>
               <p:sp>
                 <p:nvSpPr>
                   <p:cNvPr id="5" name="Oval 4">
@@ -4031,7 +4031,7 @@
                   <a:blipFill>
                     <a:blip r:embed="rId3"/>
                     <a:stretch>
-                      <a:fillRect/>
+                      <a:fillRect l="-7547"/>
                     </a:stretch>
                   </a:blipFill>
                   <a:ln>
@@ -4055,8 +4055,8 @@
               </p:sp>
             </mc:Fallback>
           </mc:AlternateContent>
-          <mc:AlternateContent xmlns:mc="http://schemas.openxmlformats.org/markup-compatibility/2006" xmlns:a14="http://schemas.microsoft.com/office/drawing/2010/main">
-            <mc:Choice Requires="a14">
+          <mc:AlternateContent xmlns:mc="http://schemas.openxmlformats.org/markup-compatibility/2006">
+            <mc:Choice xmlns:a14="http://schemas.microsoft.com/office/drawing/2010/main" Requires="a14">
               <p:sp>
                 <p:nvSpPr>
                   <p:cNvPr id="6" name="Oval 5">
@@ -4108,31 +4108,12 @@
                           <m:jc m:val="centerGroup"/>
                         </m:oMathParaPr>
                         <m:oMath xmlns:m="http://schemas.openxmlformats.org/officeDocument/2006/math">
-                          <m:sSub>
-                            <m:sSubPr>
-                              <m:ctrlPr>
-                                <a:rPr lang="en-US" b="0" i="1" dirty="0" smtClean="0">
-                                  <a:latin typeface="Cambria Math" panose="02040503050406030204" pitchFamily="18" charset="0"/>
-                                </a:rPr>
-                              </m:ctrlPr>
-                            </m:sSubPr>
-                            <m:e>
-                              <m:r>
-                                <a:rPr lang="en-US" b="0" i="1" dirty="0" smtClean="0">
-                                  <a:latin typeface="Cambria Math" panose="02040503050406030204" pitchFamily="18" charset="0"/>
-                                </a:rPr>
-                                <m:t>𝐼</m:t>
-                              </m:r>
-                            </m:e>
-                            <m:sub>
-                              <m:r>
-                                <a:rPr lang="en-US" b="0" i="1" dirty="0" smtClean="0">
-                                  <a:latin typeface="Cambria Math" panose="02040503050406030204" pitchFamily="18" charset="0"/>
-                                </a:rPr>
-                                <m:t>𝑛𝑝</m:t>
-                              </m:r>
-                            </m:sub>
-                          </m:sSub>
+                          <m:r>
+                            <a:rPr lang="en-US" b="0" i="1" dirty="0" smtClean="0">
+                              <a:latin typeface="Cambria Math" panose="02040503050406030204" pitchFamily="18" charset="0"/>
+                            </a:rPr>
+                            <m:t>𝑠𝑦𝑚</m:t>
+                          </m:r>
                         </m:oMath>
                       </m:oMathPara>
                     </a14:m>
@@ -4141,7 +4122,7 @@
                 </p:txBody>
               </p:sp>
             </mc:Choice>
-            <mc:Fallback xmlns="">
+            <mc:Fallback>
               <p:sp>
                 <p:nvSpPr>
                   <p:cNvPr id="6" name="Oval 5">
@@ -4167,7 +4148,7 @@
                   <a:blipFill>
                     <a:blip r:embed="rId4"/>
                     <a:stretch>
-                      <a:fillRect/>
+                      <a:fillRect l="-1923"/>
                     </a:stretch>
                   </a:blipFill>
                   <a:ln>
@@ -4191,8 +4172,8 @@
               </p:sp>
             </mc:Fallback>
           </mc:AlternateContent>
-          <mc:AlternateContent xmlns:mc="http://schemas.openxmlformats.org/markup-compatibility/2006" xmlns:a14="http://schemas.microsoft.com/office/drawing/2010/main">
-            <mc:Choice Requires="a14">
+          <mc:AlternateContent xmlns:mc="http://schemas.openxmlformats.org/markup-compatibility/2006">
+            <mc:Choice xmlns:a14="http://schemas.microsoft.com/office/drawing/2010/main" Requires="a14">
               <p:sp>
                 <p:nvSpPr>
                   <p:cNvPr id="7" name="Oval 6">
@@ -4244,31 +4225,12 @@
                           <m:jc m:val="centerGroup"/>
                         </m:oMathParaPr>
                         <m:oMath xmlns:m="http://schemas.openxmlformats.org/officeDocument/2006/math">
-                          <m:sSub>
-                            <m:sSubPr>
-                              <m:ctrlPr>
-                                <a:rPr lang="en-US" b="0" i="1" dirty="0" smtClean="0">
-                                  <a:latin typeface="Cambria Math" panose="02040503050406030204" pitchFamily="18" charset="0"/>
-                                </a:rPr>
-                              </m:ctrlPr>
-                            </m:sSubPr>
-                            <m:e>
-                              <m:r>
-                                <a:rPr lang="en-US" b="0" i="1" dirty="0" smtClean="0">
-                                  <a:latin typeface="Cambria Math" panose="02040503050406030204" pitchFamily="18" charset="0"/>
-                                </a:rPr>
-                                <m:t>𝐼</m:t>
-                              </m:r>
-                            </m:e>
-                            <m:sub>
-                              <m:r>
-                                <a:rPr lang="en-US" b="0" i="1" dirty="0" smtClean="0">
-                                  <a:latin typeface="Cambria Math" panose="02040503050406030204" pitchFamily="18" charset="0"/>
-                                </a:rPr>
-                                <m:t>𝑐𝑝</m:t>
-                              </m:r>
-                            </m:sub>
-                          </m:sSub>
+                          <m:r>
+                            <a:rPr lang="en-US" b="0" i="1" dirty="0" smtClean="0">
+                              <a:latin typeface="Cambria Math" panose="02040503050406030204" pitchFamily="18" charset="0"/>
+                            </a:rPr>
+                            <m:t>𝑑𝑖𝑎𝑔𝑛𝑜𝑠𝑒</m:t>
+                          </m:r>
                         </m:oMath>
                       </m:oMathPara>
                     </a14:m>
@@ -4277,7 +4239,7 @@
                 </p:txBody>
               </p:sp>
             </mc:Choice>
-            <mc:Fallback xmlns="">
+            <mc:Fallback>
               <p:sp>
                 <p:nvSpPr>
                   <p:cNvPr id="7" name="Oval 6">
@@ -4303,7 +4265,7 @@
                   <a:blipFill>
                     <a:blip r:embed="rId5"/>
                     <a:stretch>
-                      <a:fillRect/>
+                      <a:fillRect l="-44231" r="-32692"/>
                     </a:stretch>
                   </a:blipFill>
                   <a:ln>
@@ -4327,8 +4289,8 @@
               </p:sp>
             </mc:Fallback>
           </mc:AlternateContent>
-          <mc:AlternateContent xmlns:mc="http://schemas.openxmlformats.org/markup-compatibility/2006">
-            <mc:Choice xmlns:a14="http://schemas.microsoft.com/office/drawing/2010/main" Requires="a14">
+          <mc:AlternateContent xmlns:mc="http://schemas.openxmlformats.org/markup-compatibility/2006" xmlns:a14="http://schemas.microsoft.com/office/drawing/2010/main">
+            <mc:Choice Requires="a14">
               <p:sp>
                 <p:nvSpPr>
                   <p:cNvPr id="8" name="Oval 7">
@@ -4425,7 +4387,7 @@
                 </p:txBody>
               </p:sp>
             </mc:Choice>
-            <mc:Fallback>
+            <mc:Fallback xmlns="">
               <p:sp>
                 <p:nvSpPr>
                   <p:cNvPr id="8" name="Oval 7">
@@ -5074,8 +5036,8 @@
               </a:p>
             </p:txBody>
           </p:sp>
-          <mc:AlternateContent xmlns:mc="http://schemas.openxmlformats.org/markup-compatibility/2006" xmlns:a14="http://schemas.microsoft.com/office/drawing/2010/main">
-            <mc:Choice Requires="a14">
+          <mc:AlternateContent xmlns:mc="http://schemas.openxmlformats.org/markup-compatibility/2006">
+            <mc:Choice xmlns:a14="http://schemas.microsoft.com/office/drawing/2010/main" Requires="a14">
               <p:sp>
                 <p:nvSpPr>
                   <p:cNvPr id="24" name="TextBox 23">
@@ -5090,8 +5052,8 @@
                 </p:nvSpPr>
                 <p:spPr>
                   <a:xfrm>
-                    <a:off x="3692046" y="1284216"/>
-                    <a:ext cx="585788" cy="369332"/>
+                    <a:off x="3692047" y="1284216"/>
+                    <a:ext cx="585788" cy="432099"/>
                   </a:xfrm>
                   <a:prstGeom prst="rect">
                     <a:avLst/>
@@ -5112,11 +5074,22 @@
                         </m:oMathParaPr>
                         <m:oMath xmlns:m="http://schemas.openxmlformats.org/officeDocument/2006/math">
                           <m:r>
-                            <a:rPr lang="en-US" i="1" smtClean="0">
+                            <a:rPr lang="en-US" b="0" i="1" smtClean="0">
                               <a:latin typeface="Cambria Math" panose="02040503050406030204" pitchFamily="18" charset="0"/>
-                              <a:ea typeface="Cambria Math" panose="02040503050406030204" pitchFamily="18" charset="0"/>
                             </a:rPr>
-                            <m:t>𝜃</m:t>
+                            <m:t>𝑟𝑒𝑝𝑟𝑜𝑑𝑢𝑐𝑡𝑖𝑜𝑛</m:t>
+                          </m:r>
+                          <m:r>
+                            <a:rPr lang="en-US" b="0" i="1" smtClean="0">
+                              <a:latin typeface="Cambria Math" panose="02040503050406030204" pitchFamily="18" charset="0"/>
+                            </a:rPr>
+                            <m:t> </m:t>
+                          </m:r>
+                          <m:r>
+                            <a:rPr lang="en-US" b="0" i="1" smtClean="0">
+                              <a:latin typeface="Cambria Math" panose="02040503050406030204" pitchFamily="18" charset="0"/>
+                            </a:rPr>
+                            <m:t>𝑟𝑎𝑡𝑒</m:t>
                           </m:r>
                         </m:oMath>
                       </m:oMathPara>
@@ -5126,7 +5099,7 @@
                 </p:txBody>
               </p:sp>
             </mc:Choice>
-            <mc:Fallback xmlns="">
+            <mc:Fallback>
               <p:sp>
                 <p:nvSpPr>
                   <p:cNvPr id="24" name="TextBox 23">
@@ -5143,8 +5116,8 @@
                 </p:nvSpPr>
                 <p:spPr>
                   <a:xfrm>
-                    <a:off x="3692046" y="1284216"/>
-                    <a:ext cx="585788" cy="369332"/>
+                    <a:off x="3692047" y="1284216"/>
+                    <a:ext cx="585788" cy="432099"/>
                   </a:xfrm>
                   <a:prstGeom prst="rect">
                     <a:avLst/>
@@ -5152,7 +5125,7 @@
                   <a:blipFill>
                     <a:blip r:embed="rId9"/>
                     <a:stretch>
-                      <a:fillRect b="-8000"/>
+                      <a:fillRect l="-2439" r="-290244" b="-13333"/>
                     </a:stretch>
                   </a:blipFill>
                 </p:spPr>
@@ -5286,8 +5259,8 @@
               </p:sp>
             </mc:Fallback>
           </mc:AlternateContent>
-          <mc:AlternateContent xmlns:mc="http://schemas.openxmlformats.org/markup-compatibility/2006">
-            <mc:Choice xmlns:a14="http://schemas.microsoft.com/office/drawing/2010/main" Requires="a14">
+          <mc:AlternateContent xmlns:mc="http://schemas.openxmlformats.org/markup-compatibility/2006" xmlns:a14="http://schemas.microsoft.com/office/drawing/2010/main">
+            <mc:Choice Requires="a14">
               <p:sp>
                 <p:nvSpPr>
                   <p:cNvPr id="26" name="TextBox 25">
@@ -5359,7 +5332,7 @@
                 </p:txBody>
               </p:sp>
             </mc:Choice>
-            <mc:Fallback>
+            <mc:Fallback xmlns="">
               <p:sp>
                 <p:nvSpPr>
                   <p:cNvPr id="26" name="TextBox 25">
@@ -5404,8 +5377,8 @@
               </p:sp>
             </mc:Fallback>
           </mc:AlternateContent>
-          <mc:AlternateContent xmlns:mc="http://schemas.openxmlformats.org/markup-compatibility/2006">
-            <mc:Choice xmlns:a14="http://schemas.microsoft.com/office/drawing/2010/main" Requires="a14">
+          <mc:AlternateContent xmlns:mc="http://schemas.openxmlformats.org/markup-compatibility/2006" xmlns:a14="http://schemas.microsoft.com/office/drawing/2010/main">
+            <mc:Choice Requires="a14">
               <p:sp>
                 <p:nvSpPr>
                   <p:cNvPr id="27" name="TextBox 26">
@@ -5434,6 +5407,7 @@
                   </a:bodyPr>
                   <a:lstStyle/>
                   <a:p>
+                    <a:pPr/>
                     <a14:m>
                       <m:oMathPara xmlns:m="http://schemas.openxmlformats.org/officeDocument/2006/math">
                         <m:oMathParaPr>
@@ -5455,7 +5429,7 @@
                 </p:txBody>
               </p:sp>
             </mc:Choice>
-            <mc:Fallback>
+            <mc:Fallback xmlns="">
               <p:sp>
                 <p:nvSpPr>
                   <p:cNvPr id="27" name="TextBox 26">
@@ -5692,8 +5666,8 @@
               </p:sp>
             </mc:Fallback>
           </mc:AlternateContent>
-          <mc:AlternateContent xmlns:mc="http://schemas.openxmlformats.org/markup-compatibility/2006">
-            <mc:Choice xmlns:a14="http://schemas.microsoft.com/office/drawing/2010/main" Requires="a14">
+          <mc:AlternateContent xmlns:mc="http://schemas.openxmlformats.org/markup-compatibility/2006" xmlns:a14="http://schemas.microsoft.com/office/drawing/2010/main">
+            <mc:Choice Requires="a14">
               <p:sp>
                 <p:nvSpPr>
                   <p:cNvPr id="30" name="TextBox 29">
@@ -5774,7 +5748,7 @@
                 </p:txBody>
               </p:sp>
             </mc:Choice>
-            <mc:Fallback>
+            <mc:Fallback xmlns="">
               <p:sp>
                 <p:nvSpPr>
                   <p:cNvPr id="30" name="TextBox 29">
@@ -6652,8 +6626,8 @@
               </p:sp>
             </mc:Fallback>
           </mc:AlternateContent>
-          <mc:AlternateContent xmlns:mc="http://schemas.openxmlformats.org/markup-compatibility/2006">
-            <mc:Choice xmlns:a14="http://schemas.microsoft.com/office/drawing/2010/main" Requires="a14">
+          <mc:AlternateContent xmlns:mc="http://schemas.openxmlformats.org/markup-compatibility/2006" xmlns:a14="http://schemas.microsoft.com/office/drawing/2010/main">
+            <mc:Choice Requires="a14">
               <p:sp>
                 <p:nvSpPr>
                   <p:cNvPr id="48" name="TextBox 47">
@@ -6740,7 +6714,7 @@
                 </p:txBody>
               </p:sp>
             </mc:Choice>
-            <mc:Fallback>
+            <mc:Fallback xmlns="">
               <p:sp>
                 <p:nvSpPr>
                   <p:cNvPr id="48" name="TextBox 47">
@@ -7411,8 +7385,8 @@
           </p:sp>
         </mc:Fallback>
       </mc:AlternateContent>
-      <mc:AlternateContent xmlns:mc="http://schemas.openxmlformats.org/markup-compatibility/2006">
-        <mc:Choice xmlns:a14="http://schemas.microsoft.com/office/drawing/2010/main" Requires="a14">
+      <mc:AlternateContent xmlns:mc="http://schemas.openxmlformats.org/markup-compatibility/2006" xmlns:a14="http://schemas.microsoft.com/office/drawing/2010/main">
+        <mc:Choice Requires="a14">
           <p:sp>
             <p:nvSpPr>
               <p:cNvPr id="46" name="Oval 45">
@@ -7509,7 +7483,7 @@
             </p:txBody>
           </p:sp>
         </mc:Choice>
-        <mc:Fallback>
+        <mc:Fallback xmlns="">
           <p:sp>
             <p:nvSpPr>
               <p:cNvPr id="46" name="Oval 45">
@@ -7604,8 +7578,8 @@
           </a:fontRef>
         </p:style>
       </p:cxnSp>
-      <mc:AlternateContent xmlns:mc="http://schemas.openxmlformats.org/markup-compatibility/2006">
-        <mc:Choice xmlns:a14="http://schemas.microsoft.com/office/drawing/2010/main" Requires="a14">
+      <mc:AlternateContent xmlns:mc="http://schemas.openxmlformats.org/markup-compatibility/2006" xmlns:a14="http://schemas.microsoft.com/office/drawing/2010/main">
+        <mc:Choice Requires="a14">
           <p:sp>
             <p:nvSpPr>
               <p:cNvPr id="52" name="TextBox 51">
@@ -7686,7 +7660,7 @@
             </p:txBody>
           </p:sp>
         </mc:Choice>
-        <mc:Fallback>
+        <mc:Fallback xmlns="">
           <p:sp>
             <p:nvSpPr>
               <p:cNvPr id="52" name="TextBox 51">
@@ -7778,8 +7752,8 @@
           </a:fontRef>
         </p:style>
       </p:cxnSp>
-      <mc:AlternateContent xmlns:mc="http://schemas.openxmlformats.org/markup-compatibility/2006">
-        <mc:Choice xmlns:a14="http://schemas.microsoft.com/office/drawing/2010/main" Requires="a14">
+      <mc:AlternateContent xmlns:mc="http://schemas.openxmlformats.org/markup-compatibility/2006" xmlns:a14="http://schemas.microsoft.com/office/drawing/2010/main">
+        <mc:Choice Requires="a14">
           <p:sp>
             <p:nvSpPr>
               <p:cNvPr id="59" name="TextBox 58">
@@ -7866,7 +7840,7 @@
             </p:txBody>
           </p:sp>
         </mc:Choice>
-        <mc:Fallback>
+        <mc:Fallback xmlns="">
           <p:sp>
             <p:nvSpPr>
               <p:cNvPr id="59" name="TextBox 58">
@@ -7957,8 +7931,8 @@
           </a:fontRef>
         </p:style>
       </p:cxnSp>
-      <mc:AlternateContent xmlns:mc="http://schemas.openxmlformats.org/markup-compatibility/2006">
-        <mc:Choice xmlns:a14="http://schemas.microsoft.com/office/drawing/2010/main" Requires="a14">
+      <mc:AlternateContent xmlns:mc="http://schemas.openxmlformats.org/markup-compatibility/2006" xmlns:a14="http://schemas.microsoft.com/office/drawing/2010/main">
+        <mc:Choice Requires="a14">
           <p:sp>
             <p:nvSpPr>
               <p:cNvPr id="61" name="TextBox 60">
@@ -8030,7 +8004,7 @@
             </p:txBody>
           </p:sp>
         </mc:Choice>
-        <mc:Fallback>
+        <mc:Fallback xmlns="">
           <p:sp>
             <p:nvSpPr>
               <p:cNvPr id="61" name="TextBox 60">
@@ -8133,8 +8107,8 @@
           </a:p>
         </p:txBody>
       </p:sp>
-      <mc:AlternateContent xmlns:mc="http://schemas.openxmlformats.org/markup-compatibility/2006">
-        <mc:Choice xmlns:a14="http://schemas.microsoft.com/office/drawing/2010/main" Requires="a14">
+      <mc:AlternateContent xmlns:mc="http://schemas.openxmlformats.org/markup-compatibility/2006" xmlns:a14="http://schemas.microsoft.com/office/drawing/2010/main">
+        <mc:Choice Requires="a14">
           <p:graphicFrame>
             <p:nvGraphicFramePr>
               <p:cNvPr id="4" name="Table 3">
@@ -9234,7 +9208,7 @@
             </a:graphic>
           </p:graphicFrame>
         </mc:Choice>
-        <mc:Fallback>
+        <mc:Fallback xmlns="">
           <p:graphicFrame>
             <p:nvGraphicFramePr>
               <p:cNvPr id="4" name="Table 3">
@@ -10445,8 +10419,8 @@
           <a:chExt cx="0" cy="0"/>
         </a:xfrm>
       </p:grpSpPr>
-      <mc:AlternateContent xmlns:mc="http://schemas.openxmlformats.org/markup-compatibility/2006">
-        <mc:Choice xmlns:a14="http://schemas.microsoft.com/office/drawing/2010/main" Requires="a14">
+      <mc:AlternateContent xmlns:mc="http://schemas.openxmlformats.org/markup-compatibility/2006" xmlns:a14="http://schemas.microsoft.com/office/drawing/2010/main">
+        <mc:Choice Requires="a14">
           <p:sp>
             <p:nvSpPr>
               <p:cNvPr id="2" name="Title 1">
@@ -10502,7 +10476,7 @@
             </p:txBody>
           </p:sp>
         </mc:Choice>
-        <mc:Fallback>
+        <mc:Fallback xmlns="">
           <p:sp>
             <p:nvSpPr>
               <p:cNvPr id="2" name="Title 1">
@@ -10668,8 +10642,8 @@
           <a:chExt cx="0" cy="0"/>
         </a:xfrm>
       </p:grpSpPr>
-      <mc:AlternateContent xmlns:mc="http://schemas.openxmlformats.org/markup-compatibility/2006">
-        <mc:Choice xmlns:a14="http://schemas.microsoft.com/office/drawing/2010/main" Requires="a14">
+      <mc:AlternateContent xmlns:mc="http://schemas.openxmlformats.org/markup-compatibility/2006" xmlns:a14="http://schemas.microsoft.com/office/drawing/2010/main">
+        <mc:Choice Requires="a14">
           <p:sp>
             <p:nvSpPr>
               <p:cNvPr id="2" name="Title 1">
@@ -10755,7 +10729,7 @@
             </p:txBody>
           </p:sp>
         </mc:Choice>
-        <mc:Fallback>
+        <mc:Fallback xmlns="">
           <p:sp>
             <p:nvSpPr>
               <p:cNvPr id="2" name="Title 1">
@@ -10795,8 +10769,8 @@
           </p:sp>
         </mc:Fallback>
       </mc:AlternateContent>
-      <mc:AlternateContent xmlns:mc="http://schemas.openxmlformats.org/markup-compatibility/2006">
-        <mc:Choice xmlns:a14="http://schemas.microsoft.com/office/drawing/2010/main" Requires="a14">
+      <mc:AlternateContent xmlns:mc="http://schemas.openxmlformats.org/markup-compatibility/2006" xmlns:a14="http://schemas.microsoft.com/office/drawing/2010/main">
+        <mc:Choice Requires="a14">
           <p:sp>
             <p:nvSpPr>
               <p:cNvPr id="3" name="Content Placeholder 2">
@@ -10910,7 +10884,7 @@
             </p:txBody>
           </p:sp>
         </mc:Choice>
-        <mc:Fallback>
+        <mc:Fallback xmlns="">
           <p:sp>
             <p:nvSpPr>
               <p:cNvPr id="3" name="Content Placeholder 2">
@@ -10980,8 +10954,8 @@
           <a:chExt cx="0" cy="0"/>
         </a:xfrm>
       </p:grpSpPr>
-      <mc:AlternateContent xmlns:mc="http://schemas.openxmlformats.org/markup-compatibility/2006">
-        <mc:Choice xmlns:a14="http://schemas.microsoft.com/office/drawing/2010/main" Requires="a14">
+      <mc:AlternateContent xmlns:mc="http://schemas.openxmlformats.org/markup-compatibility/2006" xmlns:a14="http://schemas.microsoft.com/office/drawing/2010/main">
+        <mc:Choice Requires="a14">
           <p:sp>
             <p:nvSpPr>
               <p:cNvPr id="2" name="Title 1">
@@ -11192,7 +11166,7 @@
             </p:txBody>
           </p:sp>
         </mc:Choice>
-        <mc:Fallback>
+        <mc:Fallback xmlns="">
           <p:sp>
             <p:nvSpPr>
               <p:cNvPr id="2" name="Title 1">
@@ -11232,8 +11206,8 @@
           </p:sp>
         </mc:Fallback>
       </mc:AlternateContent>
-      <mc:AlternateContent xmlns:mc="http://schemas.openxmlformats.org/markup-compatibility/2006">
-        <mc:Choice xmlns:a14="http://schemas.microsoft.com/office/drawing/2010/main" Requires="a14">
+      <mc:AlternateContent xmlns:mc="http://schemas.openxmlformats.org/markup-compatibility/2006" xmlns:a14="http://schemas.microsoft.com/office/drawing/2010/main">
+        <mc:Choice Requires="a14">
           <p:sp>
             <p:nvSpPr>
               <p:cNvPr id="3" name="Content Placeholder 2">
@@ -11572,7 +11546,7 @@
             </p:txBody>
           </p:sp>
         </mc:Choice>
-        <mc:Fallback>
+        <mc:Fallback xmlns="">
           <p:sp>
             <p:nvSpPr>
               <p:cNvPr id="3" name="Content Placeholder 2">

</xml_diff>

<commit_message>
added few lines for visualization which needs to be cleaned up. This version of code does calibrate the model to the data presented by ICMR
</commit_message>
<xml_diff>
--- a/Proposed compartmental model.pptx
+++ b/Proposed compartmental model.pptx
@@ -268,7 +268,7 @@
           <a:p>
             <a:fld id="{C437C6B8-CE28-7F48-9F13-5D6893AC2A38}" type="datetimeFigureOut">
               <a:rPr lang="en-US" smtClean="0"/>
-              <a:t>4/4/20</a:t>
+              <a:t>4/9/20</a:t>
             </a:fld>
             <a:endParaRPr lang="en-US"/>
           </a:p>
@@ -466,7 +466,7 @@
           <a:p>
             <a:fld id="{C437C6B8-CE28-7F48-9F13-5D6893AC2A38}" type="datetimeFigureOut">
               <a:rPr lang="en-US" smtClean="0"/>
-              <a:t>4/4/20</a:t>
+              <a:t>4/9/20</a:t>
             </a:fld>
             <a:endParaRPr lang="en-US"/>
           </a:p>
@@ -674,7 +674,7 @@
           <a:p>
             <a:fld id="{C437C6B8-CE28-7F48-9F13-5D6893AC2A38}" type="datetimeFigureOut">
               <a:rPr lang="en-US" smtClean="0"/>
-              <a:t>4/4/20</a:t>
+              <a:t>4/9/20</a:t>
             </a:fld>
             <a:endParaRPr lang="en-US"/>
           </a:p>
@@ -872,7 +872,7 @@
           <a:p>
             <a:fld id="{C437C6B8-CE28-7F48-9F13-5D6893AC2A38}" type="datetimeFigureOut">
               <a:rPr lang="en-US" smtClean="0"/>
-              <a:t>4/4/20</a:t>
+              <a:t>4/9/20</a:t>
             </a:fld>
             <a:endParaRPr lang="en-US"/>
           </a:p>
@@ -1147,7 +1147,7 @@
           <a:p>
             <a:fld id="{C437C6B8-CE28-7F48-9F13-5D6893AC2A38}" type="datetimeFigureOut">
               <a:rPr lang="en-US" smtClean="0"/>
-              <a:t>4/4/20</a:t>
+              <a:t>4/9/20</a:t>
             </a:fld>
             <a:endParaRPr lang="en-US"/>
           </a:p>
@@ -1412,7 +1412,7 @@
           <a:p>
             <a:fld id="{C437C6B8-CE28-7F48-9F13-5D6893AC2A38}" type="datetimeFigureOut">
               <a:rPr lang="en-US" smtClean="0"/>
-              <a:t>4/4/20</a:t>
+              <a:t>4/9/20</a:t>
             </a:fld>
             <a:endParaRPr lang="en-US"/>
           </a:p>
@@ -1824,7 +1824,7 @@
           <a:p>
             <a:fld id="{C437C6B8-CE28-7F48-9F13-5D6893AC2A38}" type="datetimeFigureOut">
               <a:rPr lang="en-US" smtClean="0"/>
-              <a:t>4/4/20</a:t>
+              <a:t>4/9/20</a:t>
             </a:fld>
             <a:endParaRPr lang="en-US"/>
           </a:p>
@@ -1965,7 +1965,7 @@
           <a:p>
             <a:fld id="{C437C6B8-CE28-7F48-9F13-5D6893AC2A38}" type="datetimeFigureOut">
               <a:rPr lang="en-US" smtClean="0"/>
-              <a:t>4/4/20</a:t>
+              <a:t>4/9/20</a:t>
             </a:fld>
             <a:endParaRPr lang="en-US"/>
           </a:p>
@@ -2078,7 +2078,7 @@
           <a:p>
             <a:fld id="{C437C6B8-CE28-7F48-9F13-5D6893AC2A38}" type="datetimeFigureOut">
               <a:rPr lang="en-US" smtClean="0"/>
-              <a:t>4/4/20</a:t>
+              <a:t>4/9/20</a:t>
             </a:fld>
             <a:endParaRPr lang="en-US"/>
           </a:p>
@@ -2389,7 +2389,7 @@
           <a:p>
             <a:fld id="{C437C6B8-CE28-7F48-9F13-5D6893AC2A38}" type="datetimeFigureOut">
               <a:rPr lang="en-US" smtClean="0"/>
-              <a:t>4/4/20</a:t>
+              <a:t>4/9/20</a:t>
             </a:fld>
             <a:endParaRPr lang="en-US"/>
           </a:p>
@@ -2677,7 +2677,7 @@
           <a:p>
             <a:fld id="{C437C6B8-CE28-7F48-9F13-5D6893AC2A38}" type="datetimeFigureOut">
               <a:rPr lang="en-US" smtClean="0"/>
-              <a:t>4/4/20</a:t>
+              <a:t>4/9/20</a:t>
             </a:fld>
             <a:endParaRPr lang="en-US"/>
           </a:p>
@@ -2918,7 +2918,7 @@
           <a:p>
             <a:fld id="{C437C6B8-CE28-7F48-9F13-5D6893AC2A38}" type="datetimeFigureOut">
               <a:rPr lang="en-US" smtClean="0"/>
-              <a:t>4/4/20</a:t>
+              <a:t>4/9/20</a:t>
             </a:fld>
             <a:endParaRPr lang="en-US"/>
           </a:p>
@@ -3938,8 +3938,8 @@
               </p:sp>
             </mc:Fallback>
           </mc:AlternateContent>
-          <mc:AlternateContent xmlns:mc="http://schemas.openxmlformats.org/markup-compatibility/2006">
-            <mc:Choice xmlns:a14="http://schemas.microsoft.com/office/drawing/2010/main" Requires="a14">
+          <mc:AlternateContent xmlns:mc="http://schemas.openxmlformats.org/markup-compatibility/2006" xmlns:a14="http://schemas.microsoft.com/office/drawing/2010/main">
+            <mc:Choice Requires="a14">
               <p:sp>
                 <p:nvSpPr>
                   <p:cNvPr id="5" name="Oval 4">
@@ -4005,7 +4005,7 @@
                 </p:txBody>
               </p:sp>
             </mc:Choice>
-            <mc:Fallback>
+            <mc:Fallback xmlns="">
               <p:sp>
                 <p:nvSpPr>
                   <p:cNvPr id="5" name="Oval 4">
@@ -4055,8 +4055,8 @@
               </p:sp>
             </mc:Fallback>
           </mc:AlternateContent>
-          <mc:AlternateContent xmlns:mc="http://schemas.openxmlformats.org/markup-compatibility/2006">
-            <mc:Choice xmlns:a14="http://schemas.microsoft.com/office/drawing/2010/main" Requires="a14">
+          <mc:AlternateContent xmlns:mc="http://schemas.openxmlformats.org/markup-compatibility/2006" xmlns:a14="http://schemas.microsoft.com/office/drawing/2010/main">
+            <mc:Choice Requires="a14">
               <p:sp>
                 <p:nvSpPr>
                   <p:cNvPr id="6" name="Oval 5">
@@ -4122,7 +4122,7 @@
                 </p:txBody>
               </p:sp>
             </mc:Choice>
-            <mc:Fallback>
+            <mc:Fallback xmlns="">
               <p:sp>
                 <p:nvSpPr>
                   <p:cNvPr id="6" name="Oval 5">
@@ -4172,8 +4172,8 @@
               </p:sp>
             </mc:Fallback>
           </mc:AlternateContent>
-          <mc:AlternateContent xmlns:mc="http://schemas.openxmlformats.org/markup-compatibility/2006">
-            <mc:Choice xmlns:a14="http://schemas.microsoft.com/office/drawing/2010/main" Requires="a14">
+          <mc:AlternateContent xmlns:mc="http://schemas.openxmlformats.org/markup-compatibility/2006" xmlns:a14="http://schemas.microsoft.com/office/drawing/2010/main">
+            <mc:Choice Requires="a14">
               <p:sp>
                 <p:nvSpPr>
                   <p:cNvPr id="7" name="Oval 6">
@@ -4239,7 +4239,7 @@
                 </p:txBody>
               </p:sp>
             </mc:Choice>
-            <mc:Fallback>
+            <mc:Fallback xmlns="">
               <p:sp>
                 <p:nvSpPr>
                   <p:cNvPr id="7" name="Oval 6">
@@ -5077,7 +5077,13 @@
                             <a:rPr lang="en-US" b="0" i="1" smtClean="0">
                               <a:latin typeface="Cambria Math" panose="02040503050406030204" pitchFamily="18" charset="0"/>
                             </a:rPr>
-                            <m:t>𝑟𝑒𝑝𝑟𝑜𝑑𝑢𝑐𝑡𝑖𝑜𝑛</m:t>
+                            <m:t>𝑟𝑒𝑝𝑟𝑜𝑑𝑢𝑟</m:t>
+                          </m:r>
+                          <m:r>
+                            <a:rPr lang="en-US" b="0" i="1" smtClean="0">
+                              <a:latin typeface="Cambria Math" panose="02040503050406030204" pitchFamily="18" charset="0"/>
+                            </a:rPr>
+                            <m:t>𝑐𝑡𝑖𝑜𝑛</m:t>
                           </m:r>
                           <m:r>
                             <a:rPr lang="en-US" b="0" i="1" smtClean="0">
@@ -5125,7 +5131,7 @@
                   <a:blipFill>
                     <a:blip r:embed="rId9"/>
                     <a:stretch>
-                      <a:fillRect l="-2439" r="-290244" b="-13333"/>
+                      <a:fillRect l="-2439" r="-309756" b="-13333"/>
                     </a:stretch>
                   </a:blipFill>
                 </p:spPr>

</xml_diff>